<commit_message>
new spec - BOM of album header
</commit_message>
<xml_diff>
--- a/source/musicpage/Documents/Music page.pptx
+++ b/source/musicpage/Documents/Music page.pptx
@@ -10,6 +10,8 @@
     <p:sldId id="258" r:id="rId4"/>
     <p:sldId id="259" r:id="rId5"/>
     <p:sldId id="260" r:id="rId6"/>
+    <p:sldId id="261" r:id="rId7"/>
+    <p:sldId id="262" r:id="rId8"/>
   </p:sldIdLst>
   <p:sldSz cx="9144000" cy="6858000" type="screen4x3"/>
   <p:notesSz cx="6858000" cy="9144000"/>
@@ -292,7 +294,7 @@
           <a:p>
             <a:fld id="{7DDD6D33-52EB-4E0A-A3B0-B44F76A61690}" type="datetimeFigureOut">
               <a:rPr lang="en-US" smtClean="0"/>
-              <a:t>3/30/2013</a:t>
+              <a:t>4/7/2013</a:t>
             </a:fld>
             <a:endParaRPr lang="en-US"/>
           </a:p>
@@ -462,7 +464,7 @@
           <a:p>
             <a:fld id="{7DDD6D33-52EB-4E0A-A3B0-B44F76A61690}" type="datetimeFigureOut">
               <a:rPr lang="en-US" smtClean="0"/>
-              <a:t>3/30/2013</a:t>
+              <a:t>4/7/2013</a:t>
             </a:fld>
             <a:endParaRPr lang="en-US"/>
           </a:p>
@@ -642,7 +644,7 @@
           <a:p>
             <a:fld id="{7DDD6D33-52EB-4E0A-A3B0-B44F76A61690}" type="datetimeFigureOut">
               <a:rPr lang="en-US" smtClean="0"/>
-              <a:t>3/30/2013</a:t>
+              <a:t>4/7/2013</a:t>
             </a:fld>
             <a:endParaRPr lang="en-US"/>
           </a:p>
@@ -812,7 +814,7 @@
           <a:p>
             <a:fld id="{7DDD6D33-52EB-4E0A-A3B0-B44F76A61690}" type="datetimeFigureOut">
               <a:rPr lang="en-US" smtClean="0"/>
-              <a:t>3/30/2013</a:t>
+              <a:t>4/7/2013</a:t>
             </a:fld>
             <a:endParaRPr lang="en-US"/>
           </a:p>
@@ -1058,7 +1060,7 @@
           <a:p>
             <a:fld id="{7DDD6D33-52EB-4E0A-A3B0-B44F76A61690}" type="datetimeFigureOut">
               <a:rPr lang="en-US" smtClean="0"/>
-              <a:t>3/30/2013</a:t>
+              <a:t>4/7/2013</a:t>
             </a:fld>
             <a:endParaRPr lang="en-US"/>
           </a:p>
@@ -1346,7 +1348,7 @@
           <a:p>
             <a:fld id="{7DDD6D33-52EB-4E0A-A3B0-B44F76A61690}" type="datetimeFigureOut">
               <a:rPr lang="en-US" smtClean="0"/>
-              <a:t>3/30/2013</a:t>
+              <a:t>4/7/2013</a:t>
             </a:fld>
             <a:endParaRPr lang="en-US"/>
           </a:p>
@@ -1768,7 +1770,7 @@
           <a:p>
             <a:fld id="{7DDD6D33-52EB-4E0A-A3B0-B44F76A61690}" type="datetimeFigureOut">
               <a:rPr lang="en-US" smtClean="0"/>
-              <a:t>3/30/2013</a:t>
+              <a:t>4/7/2013</a:t>
             </a:fld>
             <a:endParaRPr lang="en-US"/>
           </a:p>
@@ -1886,7 +1888,7 @@
           <a:p>
             <a:fld id="{7DDD6D33-52EB-4E0A-A3B0-B44F76A61690}" type="datetimeFigureOut">
               <a:rPr lang="en-US" smtClean="0"/>
-              <a:t>3/30/2013</a:t>
+              <a:t>4/7/2013</a:t>
             </a:fld>
             <a:endParaRPr lang="en-US"/>
           </a:p>
@@ -1981,7 +1983,7 @@
           <a:p>
             <a:fld id="{7DDD6D33-52EB-4E0A-A3B0-B44F76A61690}" type="datetimeFigureOut">
               <a:rPr lang="en-US" smtClean="0"/>
-              <a:t>3/30/2013</a:t>
+              <a:t>4/7/2013</a:t>
             </a:fld>
             <a:endParaRPr lang="en-US"/>
           </a:p>
@@ -2258,7 +2260,7 @@
           <a:p>
             <a:fld id="{7DDD6D33-52EB-4E0A-A3B0-B44F76A61690}" type="datetimeFigureOut">
               <a:rPr lang="en-US" smtClean="0"/>
-              <a:t>3/30/2013</a:t>
+              <a:t>4/7/2013</a:t>
             </a:fld>
             <a:endParaRPr lang="en-US"/>
           </a:p>
@@ -2511,7 +2513,7 @@
           <a:p>
             <a:fld id="{7DDD6D33-52EB-4E0A-A3B0-B44F76A61690}" type="datetimeFigureOut">
               <a:rPr lang="en-US" smtClean="0"/>
-              <a:t>3/30/2013</a:t>
+              <a:t>4/7/2013</a:t>
             </a:fld>
             <a:endParaRPr lang="en-US"/>
           </a:p>
@@ -2724,7 +2726,7 @@
           <a:p>
             <a:fld id="{7DDD6D33-52EB-4E0A-A3B0-B44F76A61690}" type="datetimeFigureOut">
               <a:rPr lang="en-US" smtClean="0"/>
-              <a:t>3/30/2013</a:t>
+              <a:t>4/7/2013</a:t>
             </a:fld>
             <a:endParaRPr lang="en-US"/>
           </a:p>
@@ -3237,7 +3239,6 @@
               <a:rPr lang="en-US" dirty="0" smtClean="0"/>
               <a:t>Using java backend</a:t>
             </a:r>
-            <a:endParaRPr lang="en-US" dirty="0" smtClean="0"/>
           </a:p>
           <a:p>
             <a:endParaRPr lang="en-US" dirty="0"/>
@@ -4119,6 +4120,747 @@
     <p:extLst>
       <p:ext uri="{BB962C8B-B14F-4D97-AF65-F5344CB8AC3E}">
         <p14:creationId xmlns:p14="http://schemas.microsoft.com/office/powerpoint/2010/main" val="1241568379"/>
+      </p:ext>
+    </p:extLst>
+  </p:cSld>
+  <p:clrMapOvr>
+    <a:masterClrMapping/>
+  </p:clrMapOvr>
+</p:sld>
+</file>
+
+<file path=ppt/slides/slide6.xml><?xml version="1.0" encoding="utf-8"?>
+<p:sld xmlns:a="http://schemas.openxmlformats.org/drawingml/2006/main" xmlns:r="http://schemas.openxmlformats.org/officeDocument/2006/relationships" xmlns:p="http://schemas.openxmlformats.org/presentationml/2006/main">
+  <p:cSld>
+    <p:spTree>
+      <p:nvGrpSpPr>
+        <p:cNvPr id="1" name=""/>
+        <p:cNvGrpSpPr/>
+        <p:nvPr/>
+      </p:nvGrpSpPr>
+      <p:grpSpPr>
+        <a:xfrm>
+          <a:off x="0" y="0"/>
+          <a:ext cx="0" cy="0"/>
+          <a:chOff x="0" y="0"/>
+          <a:chExt cx="0" cy="0"/>
+        </a:xfrm>
+      </p:grpSpPr>
+      <p:sp>
+        <p:nvSpPr>
+          <p:cNvPr id="2" name="Title 1"/>
+          <p:cNvSpPr>
+            <a:spLocks noGrp="1"/>
+          </p:cNvSpPr>
+          <p:nvPr>
+            <p:ph type="title"/>
+          </p:nvPr>
+        </p:nvSpPr>
+        <p:spPr/>
+        <p:txBody>
+          <a:bodyPr/>
+          <a:lstStyle/>
+          <a:p>
+            <a:endParaRPr lang="en-US"/>
+          </a:p>
+        </p:txBody>
+      </p:sp>
+      <p:sp>
+        <p:nvSpPr>
+          <p:cNvPr id="3" name="Content Placeholder 2"/>
+          <p:cNvSpPr>
+            <a:spLocks noGrp="1"/>
+          </p:cNvSpPr>
+          <p:nvPr>
+            <p:ph idx="1"/>
+          </p:nvPr>
+        </p:nvSpPr>
+        <p:spPr/>
+        <p:txBody>
+          <a:bodyPr>
+            <a:normAutofit/>
+          </a:bodyPr>
+          <a:lstStyle/>
+          <a:p>
+            <a:r>
+              <a:rPr lang="en-US" sz="2400" dirty="0" err="1" smtClean="0"/>
+              <a:t>Với</a:t>
+            </a:r>
+            <a:r>
+              <a:rPr lang="en-US" sz="2400" dirty="0" smtClean="0"/>
+              <a:t> </a:t>
+            </a:r>
+            <a:r>
+              <a:rPr lang="en-US" sz="2400" dirty="0" err="1" smtClean="0"/>
+              <a:t>cách</a:t>
+            </a:r>
+            <a:r>
+              <a:rPr lang="en-US" sz="2400" dirty="0" smtClean="0"/>
+              <a:t> </a:t>
+            </a:r>
+            <a:r>
+              <a:rPr lang="en-US" sz="2400" dirty="0" err="1" smtClean="0"/>
+              <a:t>sắp</a:t>
+            </a:r>
+            <a:r>
+              <a:rPr lang="en-US" sz="2400" dirty="0" smtClean="0"/>
+              <a:t> </a:t>
+            </a:r>
+            <a:r>
+              <a:rPr lang="en-US" sz="2400" dirty="0" err="1" smtClean="0"/>
+              <a:t>xếp</a:t>
+            </a:r>
+            <a:r>
+              <a:rPr lang="en-US" sz="2400" dirty="0" smtClean="0"/>
+              <a:t> album </a:t>
+            </a:r>
+            <a:r>
+              <a:rPr lang="en-US" sz="2400" dirty="0" err="1" smtClean="0"/>
+              <a:t>trên</a:t>
+            </a:r>
+            <a:r>
+              <a:rPr lang="en-US" sz="2400" dirty="0" smtClean="0"/>
+              <a:t> ta </a:t>
+            </a:r>
+            <a:r>
+              <a:rPr lang="en-US" sz="2400" dirty="0" err="1" smtClean="0"/>
+              <a:t>sẽ</a:t>
+            </a:r>
+            <a:r>
+              <a:rPr lang="en-US" sz="2400" dirty="0" smtClean="0"/>
+              <a:t> </a:t>
+            </a:r>
+            <a:r>
+              <a:rPr lang="en-US" sz="2400" dirty="0" err="1" smtClean="0"/>
+              <a:t>thực</a:t>
+            </a:r>
+            <a:r>
+              <a:rPr lang="en-US" sz="2400" dirty="0" smtClean="0"/>
+              <a:t> </a:t>
+            </a:r>
+            <a:r>
+              <a:rPr lang="en-US" sz="2400" dirty="0" err="1" smtClean="0"/>
+              <a:t>hiện</a:t>
+            </a:r>
+            <a:r>
+              <a:rPr lang="en-US" sz="2400" dirty="0" smtClean="0"/>
+              <a:t> </a:t>
+            </a:r>
+            <a:r>
+              <a:rPr lang="en-US" sz="2400" dirty="0" err="1" smtClean="0"/>
+              <a:t>như</a:t>
+            </a:r>
+            <a:r>
+              <a:rPr lang="en-US" sz="2400" dirty="0" smtClean="0"/>
+              <a:t> </a:t>
+            </a:r>
+            <a:r>
+              <a:rPr lang="en-US" sz="2400" dirty="0" err="1" smtClean="0"/>
+              <a:t>sau</a:t>
+            </a:r>
+            <a:endParaRPr lang="en-US" sz="2400" dirty="0" smtClean="0"/>
+          </a:p>
+          <a:p>
+            <a:pPr lvl="1"/>
+            <a:r>
+              <a:rPr lang="en-US" sz="2000" dirty="0" smtClean="0"/>
+              <a:t>3 </a:t>
+            </a:r>
+            <a:r>
+              <a:rPr lang="en-US" sz="2000" dirty="0" err="1" smtClean="0"/>
+              <a:t>loại</a:t>
+            </a:r>
+            <a:r>
+              <a:rPr lang="en-US" sz="2000" dirty="0"/>
+              <a:t> image </a:t>
+            </a:r>
+            <a:r>
+              <a:rPr lang="en-US" sz="2000" dirty="0" smtClean="0"/>
+              <a:t>538 x 265 , 229x 85,  85 x 85, 322 x 87,  427 x 263</a:t>
+            </a:r>
+          </a:p>
+          <a:p>
+            <a:pPr lvl="1"/>
+            <a:r>
+              <a:rPr lang="en-US" sz="2000" dirty="0" err="1" smtClean="0"/>
+              <a:t>Những</a:t>
+            </a:r>
+            <a:r>
+              <a:rPr lang="en-US" sz="2000" dirty="0" smtClean="0"/>
+              <a:t> </a:t>
+            </a:r>
+            <a:r>
+              <a:rPr lang="en-US" sz="2000" dirty="0" err="1" smtClean="0"/>
+              <a:t>khung</a:t>
+            </a:r>
+            <a:r>
+              <a:rPr lang="en-US" sz="2000" dirty="0" smtClean="0"/>
+              <a:t> </a:t>
+            </a:r>
+            <a:r>
+              <a:rPr lang="en-US" sz="2000" dirty="0" err="1" smtClean="0"/>
+              <a:t>hình</a:t>
+            </a:r>
+            <a:r>
+              <a:rPr lang="en-US" sz="2000" dirty="0" smtClean="0"/>
+              <a:t> </a:t>
+            </a:r>
+            <a:r>
+              <a:rPr lang="en-US" sz="2000" dirty="0" err="1" smtClean="0"/>
+              <a:t>này</a:t>
+            </a:r>
+            <a:r>
+              <a:rPr lang="en-US" sz="2000" dirty="0" smtClean="0"/>
+              <a:t> </a:t>
+            </a:r>
+            <a:r>
+              <a:rPr lang="en-US" sz="2000" dirty="0" err="1" smtClean="0"/>
+              <a:t>sẽ</a:t>
+            </a:r>
+            <a:r>
+              <a:rPr lang="en-US" sz="2000" dirty="0" smtClean="0"/>
+              <a:t> </a:t>
+            </a:r>
+            <a:r>
+              <a:rPr lang="en-US" sz="2000" dirty="0" err="1" smtClean="0"/>
+              <a:t>cố</a:t>
+            </a:r>
+            <a:r>
+              <a:rPr lang="en-US" sz="2000" dirty="0" smtClean="0"/>
+              <a:t> </a:t>
+            </a:r>
+            <a:r>
+              <a:rPr lang="en-US" sz="2000" dirty="0" err="1" smtClean="0"/>
+              <a:t>định</a:t>
+            </a:r>
+            <a:r>
+              <a:rPr lang="en-US" sz="2000" dirty="0" smtClean="0"/>
+              <a:t> </a:t>
+            </a:r>
+            <a:r>
+              <a:rPr lang="en-US" sz="2000" dirty="0" err="1" smtClean="0"/>
+              <a:t>vĩnh</a:t>
+            </a:r>
+            <a:r>
+              <a:rPr lang="en-US" sz="2000" dirty="0" smtClean="0"/>
+              <a:t> </a:t>
+            </a:r>
+            <a:r>
+              <a:rPr lang="en-US" sz="2000" dirty="0" err="1" smtClean="0"/>
+              <a:t>viễn</a:t>
+            </a:r>
+            <a:r>
+              <a:rPr lang="en-US" sz="2000" dirty="0" smtClean="0"/>
+              <a:t>, </a:t>
+            </a:r>
+            <a:r>
+              <a:rPr lang="en-US" sz="2000" dirty="0" err="1" smtClean="0"/>
+              <a:t>và</a:t>
+            </a:r>
+            <a:r>
+              <a:rPr lang="en-US" sz="2000" dirty="0" smtClean="0"/>
+              <a:t> </a:t>
+            </a:r>
+            <a:r>
+              <a:rPr lang="en-US" sz="2000" dirty="0" err="1" smtClean="0"/>
+              <a:t>sẽ</a:t>
+            </a:r>
+            <a:r>
+              <a:rPr lang="en-US" sz="2000" dirty="0" smtClean="0"/>
+              <a:t> </a:t>
+            </a:r>
+            <a:r>
+              <a:rPr lang="en-US" sz="2000" dirty="0" err="1" smtClean="0"/>
+              <a:t>dùng</a:t>
+            </a:r>
+            <a:r>
+              <a:rPr lang="en-US" sz="2000" dirty="0" smtClean="0"/>
+              <a:t> BOM </a:t>
+            </a:r>
+            <a:r>
+              <a:rPr lang="en-US" sz="2000" dirty="0" err="1" smtClean="0"/>
+              <a:t>để</a:t>
+            </a:r>
+            <a:r>
+              <a:rPr lang="en-US" sz="2000" dirty="0" smtClean="0"/>
+              <a:t> add data</a:t>
+            </a:r>
+          </a:p>
+          <a:p>
+            <a:pPr lvl="1"/>
+            <a:endParaRPr lang="en-US" sz="2000" dirty="0"/>
+          </a:p>
+          <a:p>
+            <a:pPr lvl="1"/>
+            <a:r>
+              <a:rPr lang="en-US" sz="2000" dirty="0" smtClean="0"/>
+              <a:t>Ý </a:t>
+            </a:r>
+            <a:r>
+              <a:rPr lang="en-US" sz="2000" dirty="0" err="1" smtClean="0"/>
+              <a:t>tưởng</a:t>
+            </a:r>
+            <a:r>
+              <a:rPr lang="en-US" sz="2000" dirty="0" smtClean="0"/>
+              <a:t> </a:t>
+            </a:r>
+            <a:r>
+              <a:rPr lang="en-US" sz="2000" dirty="0" err="1" smtClean="0"/>
+              <a:t>khác</a:t>
+            </a:r>
+            <a:r>
+              <a:rPr lang="en-US" sz="2000" dirty="0" smtClean="0"/>
+              <a:t>, </a:t>
+            </a:r>
+            <a:r>
+              <a:rPr lang="en-US" sz="2000" dirty="0" err="1" smtClean="0"/>
+              <a:t>sẽ</a:t>
+            </a:r>
+            <a:r>
+              <a:rPr lang="en-US" sz="2000" dirty="0" smtClean="0"/>
+              <a:t> </a:t>
+            </a:r>
+            <a:r>
+              <a:rPr lang="en-US" sz="2000" dirty="0" err="1" smtClean="0"/>
+              <a:t>thiết</a:t>
+            </a:r>
+            <a:r>
+              <a:rPr lang="en-US" sz="2000" dirty="0" smtClean="0"/>
+              <a:t> </a:t>
+            </a:r>
+            <a:r>
+              <a:rPr lang="en-US" sz="2000" dirty="0" err="1" smtClean="0"/>
+              <a:t>kế</a:t>
+            </a:r>
+            <a:r>
+              <a:rPr lang="en-US" sz="2000" dirty="0" smtClean="0"/>
+              <a:t> 1 BOM </a:t>
+            </a:r>
+            <a:r>
+              <a:rPr lang="en-US" sz="2000" dirty="0" err="1" smtClean="0"/>
+              <a:t>dùng</a:t>
+            </a:r>
+            <a:r>
+              <a:rPr lang="en-US" sz="2000" dirty="0" smtClean="0"/>
+              <a:t> </a:t>
+            </a:r>
+            <a:r>
+              <a:rPr lang="en-US" sz="2000" dirty="0" err="1" smtClean="0"/>
+              <a:t>để</a:t>
+            </a:r>
+            <a:r>
+              <a:rPr lang="en-US" sz="2000" dirty="0" smtClean="0"/>
+              <a:t> design </a:t>
+            </a:r>
+            <a:r>
+              <a:rPr lang="en-US" sz="2000" dirty="0" err="1" smtClean="0"/>
+              <a:t>cho</a:t>
+            </a:r>
+            <a:r>
+              <a:rPr lang="en-US" sz="2000" dirty="0" smtClean="0"/>
+              <a:t> header </a:t>
+            </a:r>
+            <a:r>
+              <a:rPr lang="en-US" sz="2000" dirty="0" err="1" smtClean="0"/>
+              <a:t>kiểu</a:t>
+            </a:r>
+            <a:r>
+              <a:rPr lang="en-US" sz="2000" dirty="0" smtClean="0"/>
+              <a:t> </a:t>
+            </a:r>
+            <a:r>
+              <a:rPr lang="en-US" sz="2000" dirty="0" err="1" smtClean="0"/>
+              <a:t>này</a:t>
+            </a:r>
+            <a:r>
+              <a:rPr lang="en-US" sz="2000" dirty="0" smtClean="0"/>
+              <a:t>. </a:t>
+            </a:r>
+            <a:r>
+              <a:rPr lang="en-US" sz="2000" dirty="0" err="1" smtClean="0"/>
+              <a:t>Kiểu</a:t>
+            </a:r>
+            <a:r>
+              <a:rPr lang="en-US" sz="2000" dirty="0" smtClean="0"/>
+              <a:t> </a:t>
+            </a:r>
+            <a:r>
+              <a:rPr lang="en-US" sz="2000" dirty="0" err="1" smtClean="0"/>
+              <a:t>kiểu</a:t>
+            </a:r>
+            <a:r>
+              <a:rPr lang="en-US" sz="2000" dirty="0" smtClean="0"/>
+              <a:t> </a:t>
+            </a:r>
+            <a:r>
+              <a:rPr lang="en-US" sz="2000" dirty="0" err="1" smtClean="0"/>
+              <a:t>như</a:t>
+            </a:r>
+            <a:r>
+              <a:rPr lang="en-US" sz="2000" dirty="0" smtClean="0"/>
+              <a:t> tags friend </a:t>
+            </a:r>
+            <a:r>
+              <a:rPr lang="en-US" sz="2000" dirty="0" err="1" smtClean="0"/>
+              <a:t>của</a:t>
+            </a:r>
+            <a:r>
+              <a:rPr lang="en-US" sz="2000" dirty="0" smtClean="0"/>
+              <a:t> </a:t>
+            </a:r>
+            <a:r>
+              <a:rPr lang="en-US" sz="2000" dirty="0" err="1" smtClean="0"/>
+              <a:t>facebook</a:t>
+            </a:r>
+            <a:r>
+              <a:rPr lang="en-US" sz="2000" dirty="0" smtClean="0"/>
+              <a:t>. :D </a:t>
+            </a:r>
+            <a:r>
+              <a:rPr lang="en-US" sz="2000" dirty="0" err="1" smtClean="0"/>
+              <a:t>ngon</a:t>
+            </a:r>
+            <a:r>
+              <a:rPr lang="en-US" sz="2000" dirty="0" smtClean="0"/>
+              <a:t> à</a:t>
+            </a:r>
+          </a:p>
+        </p:txBody>
+      </p:sp>
+      <p:pic>
+        <p:nvPicPr>
+          <p:cNvPr id="1027" name="Picture 3"/>
+          <p:cNvPicPr>
+            <a:picLocks noChangeAspect="1" noChangeArrowheads="1"/>
+          </p:cNvPicPr>
+          <p:nvPr/>
+        </p:nvPicPr>
+        <p:blipFill>
+          <a:blip r:embed="rId2">
+            <a:extLst>
+              <a:ext uri="{28A0092B-C50C-407E-A947-70E740481C1C}">
+                <a14:useLocalDpi xmlns:a14="http://schemas.microsoft.com/office/drawing/2010/main" val="0"/>
+              </a:ext>
+            </a:extLst>
+          </a:blip>
+          <a:srcRect/>
+          <a:stretch>
+            <a:fillRect/>
+          </a:stretch>
+        </p:blipFill>
+        <p:spPr bwMode="auto">
+          <a:xfrm>
+            <a:off x="-685800" y="-228600"/>
+            <a:ext cx="10534650" cy="1657350"/>
+          </a:xfrm>
+          <a:prstGeom prst="rect">
+            <a:avLst/>
+          </a:prstGeom>
+          <a:noFill/>
+          <a:ln>
+            <a:noFill/>
+          </a:ln>
+          <a:effectLst/>
+          <a:extLst>
+            <a:ext uri="{909E8E84-426E-40DD-AFC4-6F175D3DCCD1}">
+              <a14:hiddenFill xmlns:a14="http://schemas.microsoft.com/office/drawing/2010/main">
+                <a:solidFill>
+                  <a:schemeClr val="accent1"/>
+                </a:solidFill>
+              </a14:hiddenFill>
+            </a:ext>
+            <a:ext uri="{91240B29-F687-4F45-9708-019B960494DF}">
+              <a14:hiddenLine xmlns:a14="http://schemas.microsoft.com/office/drawing/2010/main" w="9525">
+                <a:solidFill>
+                  <a:schemeClr val="tx1"/>
+                </a:solidFill>
+                <a:miter lim="800000"/>
+                <a:headEnd/>
+                <a:tailEnd/>
+              </a14:hiddenLine>
+            </a:ext>
+            <a:ext uri="{AF507438-7753-43E0-B8FC-AC1667EBCBE1}">
+              <a14:hiddenEffects xmlns:a14="http://schemas.microsoft.com/office/drawing/2010/main">
+                <a:effectLst>
+                  <a:outerShdw dist="35921" dir="2700000" algn="ctr" rotWithShape="0">
+                    <a:schemeClr val="bg2"/>
+                  </a:outerShdw>
+                </a:effectLst>
+              </a14:hiddenEffects>
+            </a:ext>
+          </a:extLst>
+        </p:spPr>
+      </p:pic>
+      <p:sp>
+        <p:nvSpPr>
+          <p:cNvPr id="4" name="TextBox 3"/>
+          <p:cNvSpPr txBox="1"/>
+          <p:nvPr/>
+        </p:nvSpPr>
+        <p:spPr>
+          <a:xfrm>
+            <a:off x="1954665" y="415409"/>
+            <a:ext cx="1091966" cy="369332"/>
+          </a:xfrm>
+          <a:prstGeom prst="rect">
+            <a:avLst/>
+          </a:prstGeom>
+          <a:noFill/>
+        </p:spPr>
+        <p:txBody>
+          <a:bodyPr wrap="none" rtlCol="0">
+            <a:spAutoFit/>
+          </a:bodyPr>
+          <a:lstStyle/>
+          <a:p>
+            <a:r>
+              <a:rPr lang="en-US" dirty="0">
+                <a:solidFill>
+                  <a:schemeClr val="tx2">
+                    <a:lumMod val="60000"/>
+                    <a:lumOff val="40000"/>
+                  </a:schemeClr>
+                </a:solidFill>
+              </a:rPr>
+              <a:t>427 x 263</a:t>
+            </a:r>
+          </a:p>
+        </p:txBody>
+      </p:sp>
+      <p:sp>
+        <p:nvSpPr>
+          <p:cNvPr id="7" name="TextBox 6"/>
+          <p:cNvSpPr txBox="1"/>
+          <p:nvPr/>
+        </p:nvSpPr>
+        <p:spPr>
+          <a:xfrm>
+            <a:off x="-685800" y="285544"/>
+            <a:ext cx="1091966" cy="369332"/>
+          </a:xfrm>
+          <a:prstGeom prst="rect">
+            <a:avLst/>
+          </a:prstGeom>
+          <a:noFill/>
+        </p:spPr>
+        <p:txBody>
+          <a:bodyPr wrap="none" rtlCol="0">
+            <a:spAutoFit/>
+          </a:bodyPr>
+          <a:lstStyle/>
+          <a:p>
+            <a:r>
+              <a:rPr lang="en-US" dirty="0">
+                <a:solidFill>
+                  <a:schemeClr val="bg1"/>
+                </a:solidFill>
+              </a:rPr>
+              <a:t>538 x 265</a:t>
+            </a:r>
+          </a:p>
+        </p:txBody>
+      </p:sp>
+      <p:sp>
+        <p:nvSpPr>
+          <p:cNvPr id="8" name="TextBox 7"/>
+          <p:cNvSpPr txBox="1"/>
+          <p:nvPr/>
+        </p:nvSpPr>
+        <p:spPr>
+          <a:xfrm>
+            <a:off x="-723363" y="1047678"/>
+            <a:ext cx="922047" cy="369332"/>
+          </a:xfrm>
+          <a:prstGeom prst="rect">
+            <a:avLst/>
+          </a:prstGeom>
+          <a:noFill/>
+        </p:spPr>
+        <p:txBody>
+          <a:bodyPr wrap="none" rtlCol="0">
+            <a:spAutoFit/>
+          </a:bodyPr>
+          <a:lstStyle/>
+          <a:p>
+            <a:r>
+              <a:rPr lang="en-US" dirty="0">
+                <a:solidFill>
+                  <a:schemeClr val="bg1"/>
+                </a:solidFill>
+              </a:rPr>
+              <a:t>229x 85</a:t>
+            </a:r>
+          </a:p>
+        </p:txBody>
+      </p:sp>
+      <p:sp>
+        <p:nvSpPr>
+          <p:cNvPr id="9" name="TextBox 8"/>
+          <p:cNvSpPr txBox="1"/>
+          <p:nvPr/>
+        </p:nvSpPr>
+        <p:spPr>
+          <a:xfrm>
+            <a:off x="553334" y="1277760"/>
+            <a:ext cx="857927" cy="369332"/>
+          </a:xfrm>
+          <a:prstGeom prst="rect">
+            <a:avLst/>
+          </a:prstGeom>
+          <a:noFill/>
+        </p:spPr>
+        <p:txBody>
+          <a:bodyPr wrap="none" rtlCol="0">
+            <a:spAutoFit/>
+          </a:bodyPr>
+          <a:lstStyle/>
+          <a:p>
+            <a:r>
+              <a:rPr lang="en-US" dirty="0"/>
+              <a:t>85 x 85</a:t>
+            </a:r>
+            <a:endParaRPr lang="en-US" dirty="0">
+              <a:solidFill>
+                <a:schemeClr val="bg1"/>
+              </a:solidFill>
+            </a:endParaRPr>
+          </a:p>
+        </p:txBody>
+      </p:sp>
+      <p:sp>
+        <p:nvSpPr>
+          <p:cNvPr id="10" name="TextBox 9"/>
+          <p:cNvSpPr txBox="1"/>
+          <p:nvPr/>
+        </p:nvSpPr>
+        <p:spPr>
+          <a:xfrm>
+            <a:off x="1752600" y="-184666"/>
+            <a:ext cx="974947" cy="369332"/>
+          </a:xfrm>
+          <a:prstGeom prst="rect">
+            <a:avLst/>
+          </a:prstGeom>
+          <a:noFill/>
+        </p:spPr>
+        <p:txBody>
+          <a:bodyPr wrap="none" rtlCol="0">
+            <a:spAutoFit/>
+          </a:bodyPr>
+          <a:lstStyle/>
+          <a:p>
+            <a:r>
+              <a:rPr lang="en-US" dirty="0" smtClean="0">
+                <a:solidFill>
+                  <a:schemeClr val="bg1"/>
+                </a:solidFill>
+              </a:rPr>
+              <a:t>325 </a:t>
+            </a:r>
+            <a:r>
+              <a:rPr lang="en-US" dirty="0">
+                <a:solidFill>
+                  <a:schemeClr val="bg1"/>
+                </a:solidFill>
+              </a:rPr>
+              <a:t>x </a:t>
+            </a:r>
+            <a:r>
+              <a:rPr lang="en-US" dirty="0" smtClean="0">
+                <a:solidFill>
+                  <a:schemeClr val="bg1"/>
+                </a:solidFill>
+              </a:rPr>
+              <a:t>87</a:t>
+            </a:r>
+            <a:endParaRPr lang="en-US" dirty="0">
+              <a:solidFill>
+                <a:schemeClr val="bg1"/>
+              </a:solidFill>
+            </a:endParaRPr>
+          </a:p>
+        </p:txBody>
+      </p:sp>
+    </p:spTree>
+    <p:extLst>
+      <p:ext uri="{BB962C8B-B14F-4D97-AF65-F5344CB8AC3E}">
+        <p14:creationId xmlns:p14="http://schemas.microsoft.com/office/powerpoint/2010/main" val="1546411836"/>
+      </p:ext>
+    </p:extLst>
+  </p:cSld>
+  <p:clrMapOvr>
+    <a:masterClrMapping/>
+  </p:clrMapOvr>
+</p:sld>
+</file>
+
+<file path=ppt/slides/slide7.xml><?xml version="1.0" encoding="utf-8"?>
+<p:sld xmlns:a="http://schemas.openxmlformats.org/drawingml/2006/main" xmlns:r="http://schemas.openxmlformats.org/officeDocument/2006/relationships" xmlns:p="http://schemas.openxmlformats.org/presentationml/2006/main">
+  <p:cSld>
+    <p:spTree>
+      <p:nvGrpSpPr>
+        <p:cNvPr id="1" name=""/>
+        <p:cNvGrpSpPr/>
+        <p:nvPr/>
+      </p:nvGrpSpPr>
+      <p:grpSpPr>
+        <a:xfrm>
+          <a:off x="0" y="0"/>
+          <a:ext cx="0" cy="0"/>
+          <a:chOff x="0" y="0"/>
+          <a:chExt cx="0" cy="0"/>
+        </a:xfrm>
+      </p:grpSpPr>
+      <p:sp>
+        <p:nvSpPr>
+          <p:cNvPr id="2" name="Title 1"/>
+          <p:cNvSpPr>
+            <a:spLocks noGrp="1"/>
+          </p:cNvSpPr>
+          <p:nvPr>
+            <p:ph type="title"/>
+          </p:nvPr>
+        </p:nvSpPr>
+        <p:spPr/>
+        <p:txBody>
+          <a:bodyPr/>
+          <a:lstStyle/>
+          <a:p>
+            <a:r>
+              <a:rPr lang="en-US" dirty="0" smtClean="0"/>
+              <a:t>BOM of </a:t>
+            </a:r>
+            <a:r>
+              <a:rPr lang="en-US" smtClean="0"/>
+              <a:t>AlbumHeader</a:t>
+            </a:r>
+            <a:endParaRPr lang="en-US" dirty="0"/>
+          </a:p>
+        </p:txBody>
+      </p:sp>
+      <p:sp>
+        <p:nvSpPr>
+          <p:cNvPr id="3" name="Content Placeholder 2"/>
+          <p:cNvSpPr>
+            <a:spLocks noGrp="1"/>
+          </p:cNvSpPr>
+          <p:nvPr>
+            <p:ph idx="1"/>
+          </p:nvPr>
+        </p:nvSpPr>
+        <p:spPr/>
+        <p:txBody>
+          <a:bodyPr/>
+          <a:lstStyle/>
+          <a:p>
+            <a:endParaRPr lang="en-US" dirty="0"/>
+          </a:p>
+        </p:txBody>
+      </p:sp>
+    </p:spTree>
+    <p:extLst>
+      <p:ext uri="{BB962C8B-B14F-4D97-AF65-F5344CB8AC3E}">
+        <p14:creationId xmlns:p14="http://schemas.microsoft.com/office/powerpoint/2010/main" val="638362898"/>
       </p:ext>
     </p:extLst>
   </p:cSld>

</xml_diff>